<commit_message>
upd block schema in presentation:
</commit_message>
<xml_diff>
--- a/Presentation.pptx
+++ b/Presentation.pptx
@@ -5784,8 +5784,8 @@
         </p:blipFill>
         <p:spPr>
           <a:xfrm>
-            <a:off x="2000232" y="1142984"/>
-            <a:ext cx="4957783" cy="4732940"/>
+            <a:off x="2618850" y="1142984"/>
+            <a:ext cx="3720546" cy="4732940"/>
           </a:xfrm>
         </p:spPr>
       </p:pic>
@@ -5948,13 +5948,8 @@
             </a:pPr>
             <a:r>
               <a:rPr lang="en-US" sz="1400" dirty="0" smtClean="0"/>
-              <a:t>#define </a:t>
-            </a:r>
-            <a:r>
-              <a:rPr lang="en-US" sz="1400" smtClean="0"/>
-              <a:t>B A3</a:t>
-            </a:r>
-            <a:endParaRPr lang="en-US" sz="1400" dirty="0" smtClean="0"/>
+              <a:t>#define B A3</a:t>
+            </a:r>
           </a:p>
           <a:p>
             <a:pPr algn="just">

</xml_diff>